<commit_message>
Optimize code: Fix Spline mobile responsive, rename account->mylearning, deprecate student-dashboard, create optimization report
</commit_message>
<xml_diff>
--- a/docs/academicreport/ppt/UniLearn_Presentation.pptx
+++ b/docs/academicreport/ppt/UniLearn_Presentation.pptx
@@ -5,24 +5,24 @@
     <p:sldMasterId id="2147483648" r:id="rId1"/>
   </p:sldMasterIdLst>
   <p:sldIdLst>
-    <p:sldId id="256" r:id="rId7"/>
-    <p:sldId id="257" r:id="rId8"/>
-    <p:sldId id="258" r:id="rId9"/>
-    <p:sldId id="259" r:id="rId10"/>
-    <p:sldId id="260" r:id="rId11"/>
-    <p:sldId id="261" r:id="rId12"/>
-    <p:sldId id="262" r:id="rId13"/>
-    <p:sldId id="263" r:id="rId14"/>
-    <p:sldId id="264" r:id="rId15"/>
-    <p:sldId id="265" r:id="rId16"/>
-    <p:sldId id="266" r:id="rId17"/>
-    <p:sldId id="267" r:id="rId18"/>
-    <p:sldId id="268" r:id="rId19"/>
-    <p:sldId id="269" r:id="rId20"/>
-    <p:sldId id="270" r:id="rId21"/>
-    <p:sldId id="271" r:id="rId22"/>
-    <p:sldId id="272" r:id="rId23"/>
-    <p:sldId id="273" r:id="rId24"/>
+    <p:sldId id="256" r:id="rId2"/>
+    <p:sldId id="257" r:id="rId3"/>
+    <p:sldId id="258" r:id="rId4"/>
+    <p:sldId id="259" r:id="rId5"/>
+    <p:sldId id="260" r:id="rId6"/>
+    <p:sldId id="261" r:id="rId7"/>
+    <p:sldId id="262" r:id="rId8"/>
+    <p:sldId id="263" r:id="rId9"/>
+    <p:sldId id="264" r:id="rId10"/>
+    <p:sldId id="265" r:id="rId11"/>
+    <p:sldId id="266" r:id="rId12"/>
+    <p:sldId id="267" r:id="rId13"/>
+    <p:sldId id="268" r:id="rId14"/>
+    <p:sldId id="269" r:id="rId15"/>
+    <p:sldId id="270" r:id="rId16"/>
+    <p:sldId id="271" r:id="rId17"/>
+    <p:sldId id="272" r:id="rId18"/>
+    <p:sldId id="273" r:id="rId19"/>
   </p:sldIdLst>
   <p:sldSz cx="9144000" cy="6858000" type="screen4x3"/>
   <p:notesSz cx="6858000" cy="9144000"/>
@@ -121,6 +121,22 @@
       </a:defRPr>
     </a:lvl9pPr>
   </p:defaultTextStyle>
+  <p:extLst>
+    <p:ext uri="{EFAFB233-063F-42B5-8137-9DF3F51BA10A}">
+      <p15:sldGuideLst xmlns:p15="http://schemas.microsoft.com/office/powerpoint/2012/main">
+        <p15:guide id="1" orient="horz" pos="2160">
+          <p15:clr>
+            <a:srgbClr val="A4A3A4"/>
+          </p15:clr>
+        </p15:guide>
+        <p15:guide id="2" pos="2880">
+          <p15:clr>
+            <a:srgbClr val="A4A3A4"/>
+          </p15:clr>
+        </p15:guide>
+      </p15:sldGuideLst>
+    </p:ext>
+  </p:extLst>
 </p:presentation>
 </file>
 
@@ -162,10 +178,9 @@
           <a:lstStyle/>
           <a:p>
             <a:r>
-              <a:rPr lang="en-US" smtClean="0"/>
+              <a:rPr lang="en-US"/>
               <a:t>Click to edit Master title style</a:t>
             </a:r>
-            <a:endParaRPr lang="en-US"/>
           </a:p>
         </p:txBody>
       </p:sp>
@@ -281,10 +296,9 @@
           </a:lstStyle>
           <a:p>
             <a:r>
-              <a:rPr lang="en-US" smtClean="0"/>
+              <a:rPr lang="en-US"/>
               <a:t>Click to edit Master subtitle style</a:t>
             </a:r>
-            <a:endParaRPr lang="en-US"/>
           </a:p>
         </p:txBody>
       </p:sp>
@@ -305,7 +319,7 @@
           <a:p>
             <a:fld id="{5BCAD085-E8A6-8845-BD4E-CB4CCA059FC4}" type="datetimeFigureOut">
               <a:rPr lang="en-US" smtClean="0"/>
-              <a:t>1/27/13</a:t>
+              <a:t>08/11/2025</a:t>
             </a:fld>
             <a:endParaRPr lang="en-US"/>
           </a:p>
@@ -399,10 +413,9 @@
           <a:lstStyle/>
           <a:p>
             <a:r>
-              <a:rPr lang="en-US" smtClean="0"/>
+              <a:rPr lang="en-US"/>
               <a:t>Click to edit Master title style</a:t>
             </a:r>
-            <a:endParaRPr lang="en-US"/>
           </a:p>
         </p:txBody>
       </p:sp>
@@ -423,38 +436,37 @@
           <a:p>
             <a:pPr lvl="0"/>
             <a:r>
-              <a:rPr lang="en-US" smtClean="0"/>
+              <a:rPr lang="en-US"/>
               <a:t>Click to edit Master text styles</a:t>
             </a:r>
           </a:p>
           <a:p>
             <a:pPr lvl="1"/>
             <a:r>
-              <a:rPr lang="en-US" smtClean="0"/>
+              <a:rPr lang="en-US"/>
               <a:t>Second level</a:t>
             </a:r>
           </a:p>
           <a:p>
             <a:pPr lvl="2"/>
             <a:r>
-              <a:rPr lang="en-US" smtClean="0"/>
+              <a:rPr lang="en-US"/>
               <a:t>Third level</a:t>
             </a:r>
           </a:p>
           <a:p>
             <a:pPr lvl="3"/>
             <a:r>
-              <a:rPr lang="en-US" smtClean="0"/>
+              <a:rPr lang="en-US"/>
               <a:t>Fourth level</a:t>
             </a:r>
           </a:p>
           <a:p>
             <a:pPr lvl="4"/>
             <a:r>
-              <a:rPr lang="en-US" smtClean="0"/>
+              <a:rPr lang="en-US"/>
               <a:t>Fifth level</a:t>
             </a:r>
-            <a:endParaRPr lang="en-US"/>
           </a:p>
         </p:txBody>
       </p:sp>
@@ -475,7 +487,7 @@
           <a:p>
             <a:fld id="{5BCAD085-E8A6-8845-BD4E-CB4CCA059FC4}" type="datetimeFigureOut">
               <a:rPr lang="en-US" smtClean="0"/>
-              <a:t>1/27/13</a:t>
+              <a:t>08/11/2025</a:t>
             </a:fld>
             <a:endParaRPr lang="en-US"/>
           </a:p>
@@ -574,10 +586,9 @@
           <a:lstStyle/>
           <a:p>
             <a:r>
-              <a:rPr lang="en-US" smtClean="0"/>
+              <a:rPr lang="en-US"/>
               <a:t>Click to edit Master title style</a:t>
             </a:r>
-            <a:endParaRPr lang="en-US"/>
           </a:p>
         </p:txBody>
       </p:sp>
@@ -603,38 +614,37 @@
           <a:p>
             <a:pPr lvl="0"/>
             <a:r>
-              <a:rPr lang="en-US" smtClean="0"/>
+              <a:rPr lang="en-US"/>
               <a:t>Click to edit Master text styles</a:t>
             </a:r>
           </a:p>
           <a:p>
             <a:pPr lvl="1"/>
             <a:r>
-              <a:rPr lang="en-US" smtClean="0"/>
+              <a:rPr lang="en-US"/>
               <a:t>Second level</a:t>
             </a:r>
           </a:p>
           <a:p>
             <a:pPr lvl="2"/>
             <a:r>
-              <a:rPr lang="en-US" smtClean="0"/>
+              <a:rPr lang="en-US"/>
               <a:t>Third level</a:t>
             </a:r>
           </a:p>
           <a:p>
             <a:pPr lvl="3"/>
             <a:r>
-              <a:rPr lang="en-US" smtClean="0"/>
+              <a:rPr lang="en-US"/>
               <a:t>Fourth level</a:t>
             </a:r>
           </a:p>
           <a:p>
             <a:pPr lvl="4"/>
             <a:r>
-              <a:rPr lang="en-US" smtClean="0"/>
+              <a:rPr lang="en-US"/>
               <a:t>Fifth level</a:t>
             </a:r>
-            <a:endParaRPr lang="en-US"/>
           </a:p>
         </p:txBody>
       </p:sp>
@@ -655,7 +665,7 @@
           <a:p>
             <a:fld id="{5BCAD085-E8A6-8845-BD4E-CB4CCA059FC4}" type="datetimeFigureOut">
               <a:rPr lang="en-US" smtClean="0"/>
-              <a:t>1/27/13</a:t>
+              <a:t>08/11/2025</a:t>
             </a:fld>
             <a:endParaRPr lang="en-US"/>
           </a:p>
@@ -749,10 +759,9 @@
           <a:lstStyle/>
           <a:p>
             <a:r>
-              <a:rPr lang="en-US" smtClean="0"/>
+              <a:rPr lang="en-US"/>
               <a:t>Click to edit Master title style</a:t>
             </a:r>
-            <a:endParaRPr lang="en-US"/>
           </a:p>
         </p:txBody>
       </p:sp>
@@ -773,38 +782,37 @@
           <a:p>
             <a:pPr lvl="0"/>
             <a:r>
-              <a:rPr lang="en-US" smtClean="0"/>
+              <a:rPr lang="en-US"/>
               <a:t>Click to edit Master text styles</a:t>
             </a:r>
           </a:p>
           <a:p>
             <a:pPr lvl="1"/>
             <a:r>
-              <a:rPr lang="en-US" smtClean="0"/>
+              <a:rPr lang="en-US"/>
               <a:t>Second level</a:t>
             </a:r>
           </a:p>
           <a:p>
             <a:pPr lvl="2"/>
             <a:r>
-              <a:rPr lang="en-US" smtClean="0"/>
+              <a:rPr lang="en-US"/>
               <a:t>Third level</a:t>
             </a:r>
           </a:p>
           <a:p>
             <a:pPr lvl="3"/>
             <a:r>
-              <a:rPr lang="en-US" smtClean="0"/>
+              <a:rPr lang="en-US"/>
               <a:t>Fourth level</a:t>
             </a:r>
           </a:p>
           <a:p>
             <a:pPr lvl="4"/>
             <a:r>
-              <a:rPr lang="en-US" smtClean="0"/>
+              <a:rPr lang="en-US"/>
               <a:t>Fifth level</a:t>
             </a:r>
-            <a:endParaRPr lang="en-US"/>
           </a:p>
         </p:txBody>
       </p:sp>
@@ -825,7 +833,7 @@
           <a:p>
             <a:fld id="{5BCAD085-E8A6-8845-BD4E-CB4CCA059FC4}" type="datetimeFigureOut">
               <a:rPr lang="en-US" smtClean="0"/>
-              <a:t>1/27/13</a:t>
+              <a:t>08/11/2025</a:t>
             </a:fld>
             <a:endParaRPr lang="en-US"/>
           </a:p>
@@ -928,10 +936,9 @@
           </a:lstStyle>
           <a:p>
             <a:r>
-              <a:rPr lang="en-US" smtClean="0"/>
+              <a:rPr lang="en-US"/>
               <a:t>Click to edit Master title style</a:t>
             </a:r>
-            <a:endParaRPr lang="en-US"/>
           </a:p>
         </p:txBody>
       </p:sp>
@@ -1048,7 +1055,7 @@
           <a:p>
             <a:pPr lvl="0"/>
             <a:r>
-              <a:rPr lang="en-US" smtClean="0"/>
+              <a:rPr lang="en-US"/>
               <a:t>Click to edit Master text styles</a:t>
             </a:r>
           </a:p>
@@ -1071,7 +1078,7 @@
           <a:p>
             <a:fld id="{5BCAD085-E8A6-8845-BD4E-CB4CCA059FC4}" type="datetimeFigureOut">
               <a:rPr lang="en-US" smtClean="0"/>
-              <a:t>1/27/13</a:t>
+              <a:t>08/11/2025</a:t>
             </a:fld>
             <a:endParaRPr lang="en-US"/>
           </a:p>
@@ -1165,10 +1172,9 @@
           <a:lstStyle/>
           <a:p>
             <a:r>
-              <a:rPr lang="en-US" smtClean="0"/>
+              <a:rPr lang="en-US"/>
               <a:t>Click to edit Master title style</a:t>
             </a:r>
-            <a:endParaRPr lang="en-US"/>
           </a:p>
         </p:txBody>
       </p:sp>
@@ -1222,38 +1228,37 @@
           <a:p>
             <a:pPr lvl="0"/>
             <a:r>
-              <a:rPr lang="en-US" smtClean="0"/>
+              <a:rPr lang="en-US"/>
               <a:t>Click to edit Master text styles</a:t>
             </a:r>
           </a:p>
           <a:p>
             <a:pPr lvl="1"/>
             <a:r>
-              <a:rPr lang="en-US" smtClean="0"/>
+              <a:rPr lang="en-US"/>
               <a:t>Second level</a:t>
             </a:r>
           </a:p>
           <a:p>
             <a:pPr lvl="2"/>
             <a:r>
-              <a:rPr lang="en-US" smtClean="0"/>
+              <a:rPr lang="en-US"/>
               <a:t>Third level</a:t>
             </a:r>
           </a:p>
           <a:p>
             <a:pPr lvl="3"/>
             <a:r>
-              <a:rPr lang="en-US" smtClean="0"/>
+              <a:rPr lang="en-US"/>
               <a:t>Fourth level</a:t>
             </a:r>
           </a:p>
           <a:p>
             <a:pPr lvl="4"/>
             <a:r>
-              <a:rPr lang="en-US" smtClean="0"/>
+              <a:rPr lang="en-US"/>
               <a:t>Fifth level</a:t>
             </a:r>
-            <a:endParaRPr lang="en-US"/>
           </a:p>
         </p:txBody>
       </p:sp>
@@ -1307,38 +1312,37 @@
           <a:p>
             <a:pPr lvl="0"/>
             <a:r>
-              <a:rPr lang="en-US" smtClean="0"/>
+              <a:rPr lang="en-US"/>
               <a:t>Click to edit Master text styles</a:t>
             </a:r>
           </a:p>
           <a:p>
             <a:pPr lvl="1"/>
             <a:r>
-              <a:rPr lang="en-US" smtClean="0"/>
+              <a:rPr lang="en-US"/>
               <a:t>Second level</a:t>
             </a:r>
           </a:p>
           <a:p>
             <a:pPr lvl="2"/>
             <a:r>
-              <a:rPr lang="en-US" smtClean="0"/>
+              <a:rPr lang="en-US"/>
               <a:t>Third level</a:t>
             </a:r>
           </a:p>
           <a:p>
             <a:pPr lvl="3"/>
             <a:r>
-              <a:rPr lang="en-US" smtClean="0"/>
+              <a:rPr lang="en-US"/>
               <a:t>Fourth level</a:t>
             </a:r>
           </a:p>
           <a:p>
             <a:pPr lvl="4"/>
             <a:r>
-              <a:rPr lang="en-US" smtClean="0"/>
+              <a:rPr lang="en-US"/>
               <a:t>Fifth level</a:t>
             </a:r>
-            <a:endParaRPr lang="en-US"/>
           </a:p>
         </p:txBody>
       </p:sp>
@@ -1359,7 +1363,7 @@
           <a:p>
             <a:fld id="{5BCAD085-E8A6-8845-BD4E-CB4CCA059FC4}" type="datetimeFigureOut">
               <a:rPr lang="en-US" smtClean="0"/>
-              <a:t>1/27/13</a:t>
+              <a:t>08/11/2025</a:t>
             </a:fld>
             <a:endParaRPr lang="en-US"/>
           </a:p>
@@ -1457,10 +1461,9 @@
           </a:lstStyle>
           <a:p>
             <a:r>
-              <a:rPr lang="en-US" smtClean="0"/>
+              <a:rPr lang="en-US"/>
               <a:t>Click to edit Master title style</a:t>
             </a:r>
-            <a:endParaRPr lang="en-US"/>
           </a:p>
         </p:txBody>
       </p:sp>
@@ -1523,7 +1526,7 @@
           <a:p>
             <a:pPr lvl="0"/>
             <a:r>
-              <a:rPr lang="en-US" smtClean="0"/>
+              <a:rPr lang="en-US"/>
               <a:t>Click to edit Master text styles</a:t>
             </a:r>
           </a:p>
@@ -1579,38 +1582,37 @@
           <a:p>
             <a:pPr lvl="0"/>
             <a:r>
-              <a:rPr lang="en-US" smtClean="0"/>
+              <a:rPr lang="en-US"/>
               <a:t>Click to edit Master text styles</a:t>
             </a:r>
           </a:p>
           <a:p>
             <a:pPr lvl="1"/>
             <a:r>
-              <a:rPr lang="en-US" smtClean="0"/>
+              <a:rPr lang="en-US"/>
               <a:t>Second level</a:t>
             </a:r>
           </a:p>
           <a:p>
             <a:pPr lvl="2"/>
             <a:r>
-              <a:rPr lang="en-US" smtClean="0"/>
+              <a:rPr lang="en-US"/>
               <a:t>Third level</a:t>
             </a:r>
           </a:p>
           <a:p>
             <a:pPr lvl="3"/>
             <a:r>
-              <a:rPr lang="en-US" smtClean="0"/>
+              <a:rPr lang="en-US"/>
               <a:t>Fourth level</a:t>
             </a:r>
           </a:p>
           <a:p>
             <a:pPr lvl="4"/>
             <a:r>
-              <a:rPr lang="en-US" smtClean="0"/>
+              <a:rPr lang="en-US"/>
               <a:t>Fifth level</a:t>
             </a:r>
-            <a:endParaRPr lang="en-US"/>
           </a:p>
         </p:txBody>
       </p:sp>
@@ -1673,7 +1675,7 @@
           <a:p>
             <a:pPr lvl="0"/>
             <a:r>
-              <a:rPr lang="en-US" smtClean="0"/>
+              <a:rPr lang="en-US"/>
               <a:t>Click to edit Master text styles</a:t>
             </a:r>
           </a:p>
@@ -1729,38 +1731,37 @@
           <a:p>
             <a:pPr lvl="0"/>
             <a:r>
-              <a:rPr lang="en-US" smtClean="0"/>
+              <a:rPr lang="en-US"/>
               <a:t>Click to edit Master text styles</a:t>
             </a:r>
           </a:p>
           <a:p>
             <a:pPr lvl="1"/>
             <a:r>
-              <a:rPr lang="en-US" smtClean="0"/>
+              <a:rPr lang="en-US"/>
               <a:t>Second level</a:t>
             </a:r>
           </a:p>
           <a:p>
             <a:pPr lvl="2"/>
             <a:r>
-              <a:rPr lang="en-US" smtClean="0"/>
+              <a:rPr lang="en-US"/>
               <a:t>Third level</a:t>
             </a:r>
           </a:p>
           <a:p>
             <a:pPr lvl="3"/>
             <a:r>
-              <a:rPr lang="en-US" smtClean="0"/>
+              <a:rPr lang="en-US"/>
               <a:t>Fourth level</a:t>
             </a:r>
           </a:p>
           <a:p>
             <a:pPr lvl="4"/>
             <a:r>
-              <a:rPr lang="en-US" smtClean="0"/>
+              <a:rPr lang="en-US"/>
               <a:t>Fifth level</a:t>
             </a:r>
-            <a:endParaRPr lang="en-US"/>
           </a:p>
         </p:txBody>
       </p:sp>
@@ -1781,7 +1782,7 @@
           <a:p>
             <a:fld id="{5BCAD085-E8A6-8845-BD4E-CB4CCA059FC4}" type="datetimeFigureOut">
               <a:rPr lang="en-US" smtClean="0"/>
-              <a:t>1/27/13</a:t>
+              <a:t>08/11/2025</a:t>
             </a:fld>
             <a:endParaRPr lang="en-US"/>
           </a:p>
@@ -1875,10 +1876,9 @@
           <a:lstStyle/>
           <a:p>
             <a:r>
-              <a:rPr lang="en-US" smtClean="0"/>
+              <a:rPr lang="en-US"/>
               <a:t>Click to edit Master title style</a:t>
             </a:r>
-            <a:endParaRPr lang="en-US"/>
           </a:p>
         </p:txBody>
       </p:sp>
@@ -1899,7 +1899,7 @@
           <a:p>
             <a:fld id="{5BCAD085-E8A6-8845-BD4E-CB4CCA059FC4}" type="datetimeFigureOut">
               <a:rPr lang="en-US" smtClean="0"/>
-              <a:t>1/27/13</a:t>
+              <a:t>08/11/2025</a:t>
             </a:fld>
             <a:endParaRPr lang="en-US"/>
           </a:p>
@@ -1994,7 +1994,7 @@
           <a:p>
             <a:fld id="{5BCAD085-E8A6-8845-BD4E-CB4CCA059FC4}" type="datetimeFigureOut">
               <a:rPr lang="en-US" smtClean="0"/>
-              <a:t>1/27/13</a:t>
+              <a:t>08/11/2025</a:t>
             </a:fld>
             <a:endParaRPr lang="en-US"/>
           </a:p>
@@ -2097,10 +2097,9 @@
           </a:lstStyle>
           <a:p>
             <a:r>
-              <a:rPr lang="en-US" smtClean="0"/>
+              <a:rPr lang="en-US"/>
               <a:t>Click to edit Master title style</a:t>
             </a:r>
-            <a:endParaRPr lang="en-US"/>
           </a:p>
         </p:txBody>
       </p:sp>
@@ -2154,38 +2153,37 @@
           <a:p>
             <a:pPr lvl="0"/>
             <a:r>
-              <a:rPr lang="en-US" smtClean="0"/>
+              <a:rPr lang="en-US"/>
               <a:t>Click to edit Master text styles</a:t>
             </a:r>
           </a:p>
           <a:p>
             <a:pPr lvl="1"/>
             <a:r>
-              <a:rPr lang="en-US" smtClean="0"/>
+              <a:rPr lang="en-US"/>
               <a:t>Second level</a:t>
             </a:r>
           </a:p>
           <a:p>
             <a:pPr lvl="2"/>
             <a:r>
-              <a:rPr lang="en-US" smtClean="0"/>
+              <a:rPr lang="en-US"/>
               <a:t>Third level</a:t>
             </a:r>
           </a:p>
           <a:p>
             <a:pPr lvl="3"/>
             <a:r>
-              <a:rPr lang="en-US" smtClean="0"/>
+              <a:rPr lang="en-US"/>
               <a:t>Fourth level</a:t>
             </a:r>
           </a:p>
           <a:p>
             <a:pPr lvl="4"/>
             <a:r>
-              <a:rPr lang="en-US" smtClean="0"/>
+              <a:rPr lang="en-US"/>
               <a:t>Fifth level</a:t>
             </a:r>
-            <a:endParaRPr lang="en-US"/>
           </a:p>
         </p:txBody>
       </p:sp>
@@ -2248,7 +2246,7 @@
           <a:p>
             <a:pPr lvl="0"/>
             <a:r>
-              <a:rPr lang="en-US" smtClean="0"/>
+              <a:rPr lang="en-US"/>
               <a:t>Click to edit Master text styles</a:t>
             </a:r>
           </a:p>
@@ -2271,7 +2269,7 @@
           <a:p>
             <a:fld id="{5BCAD085-E8A6-8845-BD4E-CB4CCA059FC4}" type="datetimeFigureOut">
               <a:rPr lang="en-US" smtClean="0"/>
-              <a:t>1/27/13</a:t>
+              <a:t>08/11/2025</a:t>
             </a:fld>
             <a:endParaRPr lang="en-US"/>
           </a:p>
@@ -2374,10 +2372,9 @@
           </a:lstStyle>
           <a:p>
             <a:r>
-              <a:rPr lang="en-US" smtClean="0"/>
+              <a:rPr lang="en-US"/>
               <a:t>Click to edit Master title style</a:t>
             </a:r>
-            <a:endParaRPr lang="en-US"/>
           </a:p>
         </p:txBody>
       </p:sp>
@@ -2501,7 +2498,7 @@
           <a:p>
             <a:pPr lvl="0"/>
             <a:r>
-              <a:rPr lang="en-US" smtClean="0"/>
+              <a:rPr lang="en-US"/>
               <a:t>Click to edit Master text styles</a:t>
             </a:r>
           </a:p>
@@ -2524,7 +2521,7 @@
           <a:p>
             <a:fld id="{5BCAD085-E8A6-8845-BD4E-CB4CCA059FC4}" type="datetimeFigureOut">
               <a:rPr lang="en-US" smtClean="0"/>
-              <a:t>1/27/13</a:t>
+              <a:t>08/11/2025</a:t>
             </a:fld>
             <a:endParaRPr lang="en-US"/>
           </a:p>
@@ -2633,10 +2630,9 @@
           <a:lstStyle/>
           <a:p>
             <a:r>
-              <a:rPr lang="en-US" smtClean="0"/>
+              <a:rPr lang="en-US"/>
               <a:t>Click to edit Master title style</a:t>
             </a:r>
-            <a:endParaRPr lang="en-US"/>
           </a:p>
         </p:txBody>
       </p:sp>
@@ -2667,38 +2663,37 @@
           <a:p>
             <a:pPr lvl="0"/>
             <a:r>
-              <a:rPr lang="en-US" smtClean="0"/>
+              <a:rPr lang="en-US"/>
               <a:t>Click to edit Master text styles</a:t>
             </a:r>
           </a:p>
           <a:p>
             <a:pPr lvl="1"/>
             <a:r>
-              <a:rPr lang="en-US" smtClean="0"/>
+              <a:rPr lang="en-US"/>
               <a:t>Second level</a:t>
             </a:r>
           </a:p>
           <a:p>
             <a:pPr lvl="2"/>
             <a:r>
-              <a:rPr lang="en-US" smtClean="0"/>
+              <a:rPr lang="en-US"/>
               <a:t>Third level</a:t>
             </a:r>
           </a:p>
           <a:p>
             <a:pPr lvl="3"/>
             <a:r>
-              <a:rPr lang="en-US" smtClean="0"/>
+              <a:rPr lang="en-US"/>
               <a:t>Fourth level</a:t>
             </a:r>
           </a:p>
           <a:p>
             <a:pPr lvl="4"/>
             <a:r>
-              <a:rPr lang="en-US" smtClean="0"/>
+              <a:rPr lang="en-US"/>
               <a:t>Fifth level</a:t>
             </a:r>
-            <a:endParaRPr lang="en-US"/>
           </a:p>
         </p:txBody>
       </p:sp>
@@ -2737,7 +2732,7 @@
           <a:p>
             <a:fld id="{5BCAD085-E8A6-8845-BD4E-CB4CCA059FC4}" type="datetimeFigureOut">
               <a:rPr lang="en-US" smtClean="0"/>
-              <a:t>1/27/13</a:t>
+              <a:t>08/11/2025</a:t>
             </a:fld>
             <a:endParaRPr lang="en-US"/>
           </a:p>
@@ -3096,7 +3091,7 @@
 </file>
 
 <file path=ppt/slides/slide1.xml><?xml version="1.0" encoding="utf-8"?>
-<p:sld xmlns:a="http://schemas.openxmlformats.org/drawingml/2006/main" xmlns:p="http://schemas.openxmlformats.org/presentationml/2006/main" xmlns:r="http://schemas.openxmlformats.org/officeDocument/2006/relationships">
+<p:sld xmlns:a="http://schemas.openxmlformats.org/drawingml/2006/main" xmlns:r="http://schemas.openxmlformats.org/officeDocument/2006/relationships" xmlns:p="http://schemas.openxmlformats.org/presentationml/2006/main">
   <p:cSld>
     <p:spTree>
       <p:nvGrpSpPr>
@@ -3104,7 +3099,14 @@
         <p:cNvGrpSpPr/>
         <p:nvPr/>
       </p:nvGrpSpPr>
-      <p:grpSpPr/>
+      <p:grpSpPr>
+        <a:xfrm>
+          <a:off x="0" y="0"/>
+          <a:ext cx="0" cy="0"/>
+          <a:chOff x="0" y="0"/>
+          <a:chExt cx="0" cy="0"/>
+        </a:xfrm>
+      </p:grpSpPr>
       <p:sp>
         <p:nvSpPr>
           <p:cNvPr id="2" name="TextBox 1"/>
@@ -3267,7 +3269,7 @@
 </file>
 
 <file path=ppt/slides/slide10.xml><?xml version="1.0" encoding="utf-8"?>
-<p:sld xmlns:a="http://schemas.openxmlformats.org/drawingml/2006/main" xmlns:p="http://schemas.openxmlformats.org/presentationml/2006/main" xmlns:r="http://schemas.openxmlformats.org/officeDocument/2006/relationships">
+<p:sld xmlns:a="http://schemas.openxmlformats.org/drawingml/2006/main" xmlns:r="http://schemas.openxmlformats.org/officeDocument/2006/relationships" xmlns:p="http://schemas.openxmlformats.org/presentationml/2006/main">
   <p:cSld>
     <p:spTree>
       <p:nvGrpSpPr>
@@ -3275,7 +3277,14 @@
         <p:cNvGrpSpPr/>
         <p:nvPr/>
       </p:nvGrpSpPr>
-      <p:grpSpPr/>
+      <p:grpSpPr>
+        <a:xfrm>
+          <a:off x="0" y="0"/>
+          <a:ext cx="0" cy="0"/>
+          <a:chOff x="0" y="0"/>
+          <a:chExt cx="0" cy="0"/>
+        </a:xfrm>
+      </p:grpSpPr>
       <p:sp>
         <p:nvSpPr>
           <p:cNvPr id="2" name="TextBox 1"/>
@@ -3367,7 +3376,9 @@
             <a:spAutoFit/>
           </a:bodyPr>
           <a:lstStyle/>
-          <a:p/>
+          <a:p>
+            <a:endParaRPr/>
+          </a:p>
           <a:p>
             <a:pPr algn="ctr">
               <a:spcBef>
@@ -3424,7 +3435,7 @@
 </file>
 
 <file path=ppt/slides/slide11.xml><?xml version="1.0" encoding="utf-8"?>
-<p:sld xmlns:a="http://schemas.openxmlformats.org/drawingml/2006/main" xmlns:p="http://schemas.openxmlformats.org/presentationml/2006/main" xmlns:r="http://schemas.openxmlformats.org/officeDocument/2006/relationships">
+<p:sld xmlns:a="http://schemas.openxmlformats.org/drawingml/2006/main" xmlns:r="http://schemas.openxmlformats.org/officeDocument/2006/relationships" xmlns:p="http://schemas.openxmlformats.org/presentationml/2006/main">
   <p:cSld>
     <p:spTree>
       <p:nvGrpSpPr>
@@ -3432,7 +3443,14 @@
         <p:cNvGrpSpPr/>
         <p:nvPr/>
       </p:nvGrpSpPr>
-      <p:grpSpPr/>
+      <p:grpSpPr>
+        <a:xfrm>
+          <a:off x="0" y="0"/>
+          <a:ext cx="0" cy="0"/>
+          <a:chOff x="0" y="0"/>
+          <a:chExt cx="0" cy="0"/>
+        </a:xfrm>
+      </p:grpSpPr>
       <p:sp>
         <p:nvSpPr>
           <p:cNvPr id="2" name="TextBox 1"/>
@@ -3489,7 +3507,9 @@
             <a:spAutoFit/>
           </a:bodyPr>
           <a:lstStyle/>
-          <a:p/>
+          <a:p>
+            <a:endParaRPr/>
+          </a:p>
           <a:p>
             <a:pPr>
               <a:spcBef>
@@ -3744,7 +3764,7 @@
 </file>
 
 <file path=ppt/slides/slide12.xml><?xml version="1.0" encoding="utf-8"?>
-<p:sld xmlns:a="http://schemas.openxmlformats.org/drawingml/2006/main" xmlns:p="http://schemas.openxmlformats.org/presentationml/2006/main" xmlns:r="http://schemas.openxmlformats.org/officeDocument/2006/relationships">
+<p:sld xmlns:a="http://schemas.openxmlformats.org/drawingml/2006/main" xmlns:r="http://schemas.openxmlformats.org/officeDocument/2006/relationships" xmlns:p="http://schemas.openxmlformats.org/presentationml/2006/main">
   <p:cSld>
     <p:spTree>
       <p:nvGrpSpPr>
@@ -3752,7 +3772,14 @@
         <p:cNvGrpSpPr/>
         <p:nvPr/>
       </p:nvGrpSpPr>
-      <p:grpSpPr/>
+      <p:grpSpPr>
+        <a:xfrm>
+          <a:off x="0" y="0"/>
+          <a:ext cx="0" cy="0"/>
+          <a:chOff x="0" y="0"/>
+          <a:chExt cx="0" cy="0"/>
+        </a:xfrm>
+      </p:grpSpPr>
       <p:sp>
         <p:nvSpPr>
           <p:cNvPr id="2" name="TextBox 1"/>
@@ -3809,7 +3836,9 @@
             <a:spAutoFit/>
           </a:bodyPr>
           <a:lstStyle/>
-          <a:p/>
+          <a:p>
+            <a:endParaRPr/>
+          </a:p>
           <a:p>
             <a:pPr>
               <a:spcBef>
@@ -3956,7 +3985,7 @@
 </file>
 
 <file path=ppt/slides/slide13.xml><?xml version="1.0" encoding="utf-8"?>
-<p:sld xmlns:a="http://schemas.openxmlformats.org/drawingml/2006/main" xmlns:p="http://schemas.openxmlformats.org/presentationml/2006/main" xmlns:r="http://schemas.openxmlformats.org/officeDocument/2006/relationships">
+<p:sld xmlns:a="http://schemas.openxmlformats.org/drawingml/2006/main" xmlns:r="http://schemas.openxmlformats.org/officeDocument/2006/relationships" xmlns:p="http://schemas.openxmlformats.org/presentationml/2006/main">
   <p:cSld>
     <p:spTree>
       <p:nvGrpSpPr>
@@ -3964,7 +3993,14 @@
         <p:cNvGrpSpPr/>
         <p:nvPr/>
       </p:nvGrpSpPr>
-      <p:grpSpPr/>
+      <p:grpSpPr>
+        <a:xfrm>
+          <a:off x="0" y="0"/>
+          <a:ext cx="0" cy="0"/>
+          <a:chOff x="0" y="0"/>
+          <a:chExt cx="0" cy="0"/>
+        </a:xfrm>
+      </p:grpSpPr>
       <p:sp>
         <p:nvSpPr>
           <p:cNvPr id="2" name="TextBox 1"/>
@@ -4019,10 +4055,34 @@
                 <a:tableStyleId>{5C22544A-7EE6-4342-B048-85BDC9FD1C3A}</a:tableStyleId>
               </a:tblPr>
               <a:tblGrid>
-                <a:gridCol w="2743200"/>
-                <a:gridCol w="1371600"/>
-                <a:gridCol w="1645920"/>
-                <a:gridCol w="1554480"/>
+                <a:gridCol w="2743200">
+                  <a:extLst>
+                    <a:ext uri="{9D8B030D-6E8A-4147-A177-3AD203B41FA5}">
+                      <a16:colId xmlns:a16="http://schemas.microsoft.com/office/drawing/2014/main" val="20000"/>
+                    </a:ext>
+                  </a:extLst>
+                </a:gridCol>
+                <a:gridCol w="1371600">
+                  <a:extLst>
+                    <a:ext uri="{9D8B030D-6E8A-4147-A177-3AD203B41FA5}">
+                      <a16:colId xmlns:a16="http://schemas.microsoft.com/office/drawing/2014/main" val="20001"/>
+                    </a:ext>
+                  </a:extLst>
+                </a:gridCol>
+                <a:gridCol w="1645920">
+                  <a:extLst>
+                    <a:ext uri="{9D8B030D-6E8A-4147-A177-3AD203B41FA5}">
+                      <a16:colId xmlns:a16="http://schemas.microsoft.com/office/drawing/2014/main" val="20002"/>
+                    </a:ext>
+                  </a:extLst>
+                </a:gridCol>
+                <a:gridCol w="1554480">
+                  <a:extLst>
+                    <a:ext uri="{9D8B030D-6E8A-4147-A177-3AD203B41FA5}">
+                      <a16:colId xmlns:a16="http://schemas.microsoft.com/office/drawing/2014/main" val="20003"/>
+                    </a:ext>
+                  </a:extLst>
+                </a:gridCol>
               </a:tblGrid>
               <a:tr h="609600">
                 <a:tc>
@@ -4117,6 +4177,11 @@
                     </a:solidFill>
                   </a:tcPr>
                 </a:tc>
+                <a:extLst>
+                  <a:ext uri="{0D108BD9-81ED-4DB2-BD59-A6C34878D82A}">
+                    <a16:rowId xmlns:a16="http://schemas.microsoft.com/office/drawing/2014/main" val="10000"/>
+                  </a:ext>
+                </a:extLst>
               </a:tr>
               <a:tr h="609600">
                 <a:tc>
@@ -4195,6 +4260,11 @@
                   </a:txBody>
                   <a:tcPr/>
                 </a:tc>
+                <a:extLst>
+                  <a:ext uri="{0D108BD9-81ED-4DB2-BD59-A6C34878D82A}">
+                    <a16:rowId xmlns:a16="http://schemas.microsoft.com/office/drawing/2014/main" val="10001"/>
+                  </a:ext>
+                </a:extLst>
               </a:tr>
               <a:tr h="609600">
                 <a:tc>
@@ -4273,6 +4343,11 @@
                   </a:txBody>
                   <a:tcPr/>
                 </a:tc>
+                <a:extLst>
+                  <a:ext uri="{0D108BD9-81ED-4DB2-BD59-A6C34878D82A}">
+                    <a16:rowId xmlns:a16="http://schemas.microsoft.com/office/drawing/2014/main" val="10002"/>
+                  </a:ext>
+                </a:extLst>
               </a:tr>
               <a:tr h="609600">
                 <a:tc>
@@ -4351,6 +4426,11 @@
                   </a:txBody>
                   <a:tcPr/>
                 </a:tc>
+                <a:extLst>
+                  <a:ext uri="{0D108BD9-81ED-4DB2-BD59-A6C34878D82A}">
+                    <a16:rowId xmlns:a16="http://schemas.microsoft.com/office/drawing/2014/main" val="10003"/>
+                  </a:ext>
+                </a:extLst>
               </a:tr>
               <a:tr h="609600">
                 <a:tc>
@@ -4429,6 +4509,11 @@
                   </a:txBody>
                   <a:tcPr/>
                 </a:tc>
+                <a:extLst>
+                  <a:ext uri="{0D108BD9-81ED-4DB2-BD59-A6C34878D82A}">
+                    <a16:rowId xmlns:a16="http://schemas.microsoft.com/office/drawing/2014/main" val="10004"/>
+                  </a:ext>
+                </a:extLst>
               </a:tr>
               <a:tr h="609600">
                 <a:tc>
@@ -4507,6 +4592,11 @@
                   </a:txBody>
                   <a:tcPr/>
                 </a:tc>
+                <a:extLst>
+                  <a:ext uri="{0D108BD9-81ED-4DB2-BD59-A6C34878D82A}">
+                    <a16:rowId xmlns:a16="http://schemas.microsoft.com/office/drawing/2014/main" val="10005"/>
+                  </a:ext>
+                </a:extLst>
               </a:tr>
             </a:tbl>
           </a:graphicData>
@@ -4521,7 +4611,7 @@
 </file>
 
 <file path=ppt/slides/slide14.xml><?xml version="1.0" encoding="utf-8"?>
-<p:sld xmlns:a="http://schemas.openxmlformats.org/drawingml/2006/main" xmlns:p="http://schemas.openxmlformats.org/presentationml/2006/main" xmlns:r="http://schemas.openxmlformats.org/officeDocument/2006/relationships">
+<p:sld xmlns:a="http://schemas.openxmlformats.org/drawingml/2006/main" xmlns:r="http://schemas.openxmlformats.org/officeDocument/2006/relationships" xmlns:p="http://schemas.openxmlformats.org/presentationml/2006/main">
   <p:cSld>
     <p:spTree>
       <p:nvGrpSpPr>
@@ -4529,7 +4619,14 @@
         <p:cNvGrpSpPr/>
         <p:nvPr/>
       </p:nvGrpSpPr>
-      <p:grpSpPr/>
+      <p:grpSpPr>
+        <a:xfrm>
+          <a:off x="0" y="0"/>
+          <a:ext cx="0" cy="0"/>
+          <a:chOff x="0" y="0"/>
+          <a:chExt cx="0" cy="0"/>
+        </a:xfrm>
+      </p:grpSpPr>
       <p:sp>
         <p:nvSpPr>
           <p:cNvPr id="2" name="TextBox 1"/>
@@ -4586,7 +4683,9 @@
             <a:spAutoFit/>
           </a:bodyPr>
           <a:lstStyle/>
-          <a:p/>
+          <a:p>
+            <a:endParaRPr/>
+          </a:p>
           <a:p>
             <a:pPr>
               <a:spcBef>
@@ -4733,7 +4832,7 @@
 </file>
 
 <file path=ppt/slides/slide15.xml><?xml version="1.0" encoding="utf-8"?>
-<p:sld xmlns:a="http://schemas.openxmlformats.org/drawingml/2006/main" xmlns:p="http://schemas.openxmlformats.org/presentationml/2006/main" xmlns:r="http://schemas.openxmlformats.org/officeDocument/2006/relationships">
+<p:sld xmlns:a="http://schemas.openxmlformats.org/drawingml/2006/main" xmlns:r="http://schemas.openxmlformats.org/officeDocument/2006/relationships" xmlns:p="http://schemas.openxmlformats.org/presentationml/2006/main">
   <p:cSld>
     <p:spTree>
       <p:nvGrpSpPr>
@@ -4741,7 +4840,14 @@
         <p:cNvGrpSpPr/>
         <p:nvPr/>
       </p:nvGrpSpPr>
-      <p:grpSpPr/>
+      <p:grpSpPr>
+        <a:xfrm>
+          <a:off x="0" y="0"/>
+          <a:ext cx="0" cy="0"/>
+          <a:chOff x="0" y="0"/>
+          <a:chExt cx="0" cy="0"/>
+        </a:xfrm>
+      </p:grpSpPr>
       <p:sp>
         <p:nvSpPr>
           <p:cNvPr id="2" name="TextBox 1"/>
@@ -5236,7 +5342,7 @@
 </file>
 
 <file path=ppt/slides/slide16.xml><?xml version="1.0" encoding="utf-8"?>
-<p:sld xmlns:a="http://schemas.openxmlformats.org/drawingml/2006/main" xmlns:p="http://schemas.openxmlformats.org/presentationml/2006/main" xmlns:r="http://schemas.openxmlformats.org/officeDocument/2006/relationships">
+<p:sld xmlns:a="http://schemas.openxmlformats.org/drawingml/2006/main" xmlns:r="http://schemas.openxmlformats.org/officeDocument/2006/relationships" xmlns:p="http://schemas.openxmlformats.org/presentationml/2006/main">
   <p:cSld>
     <p:spTree>
       <p:nvGrpSpPr>
@@ -5244,7 +5350,14 @@
         <p:cNvGrpSpPr/>
         <p:nvPr/>
       </p:nvGrpSpPr>
-      <p:grpSpPr/>
+      <p:grpSpPr>
+        <a:xfrm>
+          <a:off x="0" y="0"/>
+          <a:ext cx="0" cy="0"/>
+          <a:chOff x="0" y="0"/>
+          <a:chExt cx="0" cy="0"/>
+        </a:xfrm>
+      </p:grpSpPr>
       <p:sp>
         <p:nvSpPr>
           <p:cNvPr id="2" name="TextBox 1"/>
@@ -5301,7 +5414,9 @@
             <a:spAutoFit/>
           </a:bodyPr>
           <a:lstStyle/>
-          <a:p/>
+          <a:p>
+            <a:endParaRPr dirty="0"/>
+          </a:p>
           <a:p>
             <a:pPr>
               <a:spcBef>
@@ -5314,6 +5429,7 @@
               </a:defRPr>
             </a:pPr>
             <a:r>
+              <a:rPr dirty="0"/>
               <a:t>Phase 1 (3 months)</a:t>
             </a:r>
           </a:p>
@@ -5326,6 +5442,7 @@
               </a:defRPr>
             </a:pPr>
             <a:r>
+              <a:rPr dirty="0"/>
               <a:t>• Live video classes with WebRTC</a:t>
             </a:r>
           </a:p>
@@ -5338,6 +5455,7 @@
               </a:defRPr>
             </a:pPr>
             <a:r>
+              <a:rPr dirty="0"/>
               <a:t>• AI-powered course recommendations</a:t>
             </a:r>
           </a:p>
@@ -5350,6 +5468,7 @@
               </a:defRPr>
             </a:pPr>
             <a:r>
+              <a:rPr dirty="0"/>
               <a:t>• Mobile apps (iOS + Android with React Native)</a:t>
             </a:r>
           </a:p>
@@ -5365,6 +5484,7 @@
               </a:defRPr>
             </a:pPr>
             <a:r>
+              <a:rPr dirty="0"/>
               <a:t>Phase 2 (6-12 months)</a:t>
             </a:r>
           </a:p>
@@ -5377,6 +5497,7 @@
               </a:defRPr>
             </a:pPr>
             <a:r>
+              <a:rPr dirty="0"/>
               <a:t>• Gamification system (badges, leaderboards)</a:t>
             </a:r>
           </a:p>
@@ -5389,6 +5510,7 @@
               </a:defRPr>
             </a:pPr>
             <a:r>
+              <a:rPr dirty="0"/>
               <a:t>• Multi-language support (i18n)</a:t>
             </a:r>
           </a:p>
@@ -5401,6 +5523,7 @@
               </a:defRPr>
             </a:pPr>
             <a:r>
+              <a:rPr dirty="0"/>
               <a:t>• Advanced analytics dashboard for instructors</a:t>
             </a:r>
           </a:p>
@@ -5413,6 +5536,7 @@
               </a:defRPr>
             </a:pPr>
             <a:r>
+              <a:rPr dirty="0"/>
               <a:t>• Peer-to-peer study groups with video chat</a:t>
             </a:r>
           </a:p>
@@ -5428,6 +5552,7 @@
               </a:defRPr>
             </a:pPr>
             <a:r>
+              <a:rPr dirty="0"/>
               <a:t>Phase 3 (Long-term)</a:t>
             </a:r>
           </a:p>
@@ -5440,6 +5565,7 @@
               </a:defRPr>
             </a:pPr>
             <a:r>
+              <a:rPr dirty="0"/>
               <a:t>• Enterprise B2B platform for corporate training</a:t>
             </a:r>
           </a:p>
@@ -5452,6 +5578,7 @@
               </a:defRPr>
             </a:pPr>
             <a:r>
+              <a:rPr dirty="0"/>
               <a:t>• Blockchain certificate verification</a:t>
             </a:r>
           </a:p>
@@ -5464,6 +5591,7 @@
               </a:defRPr>
             </a:pPr>
             <a:r>
+              <a:rPr dirty="0"/>
               <a:t>• VR learning modules for immersive education</a:t>
             </a:r>
           </a:p>
@@ -5478,7 +5606,7 @@
 </file>
 
 <file path=ppt/slides/slide17.xml><?xml version="1.0" encoding="utf-8"?>
-<p:sld xmlns:a="http://schemas.openxmlformats.org/drawingml/2006/main" xmlns:p="http://schemas.openxmlformats.org/presentationml/2006/main" xmlns:r="http://schemas.openxmlformats.org/officeDocument/2006/relationships">
+<p:sld xmlns:a="http://schemas.openxmlformats.org/drawingml/2006/main" xmlns:r="http://schemas.openxmlformats.org/officeDocument/2006/relationships" xmlns:p="http://schemas.openxmlformats.org/presentationml/2006/main">
   <p:cSld>
     <p:spTree>
       <p:nvGrpSpPr>
@@ -5486,7 +5614,14 @@
         <p:cNvGrpSpPr/>
         <p:nvPr/>
       </p:nvGrpSpPr>
-      <p:grpSpPr/>
+      <p:grpSpPr>
+        <a:xfrm>
+          <a:off x="0" y="0"/>
+          <a:ext cx="0" cy="0"/>
+          <a:chOff x="0" y="0"/>
+          <a:chExt cx="0" cy="0"/>
+        </a:xfrm>
+      </p:grpSpPr>
       <p:sp>
         <p:nvSpPr>
           <p:cNvPr id="2" name="TextBox 1"/>
@@ -5543,7 +5678,9 @@
             <a:spAutoFit/>
           </a:bodyPr>
           <a:lstStyle/>
-          <a:p/>
+          <a:p>
+            <a:endParaRPr/>
+          </a:p>
           <a:p>
             <a:pPr>
               <a:spcBef>
@@ -5695,7 +5832,7 @@
 </file>
 
 <file path=ppt/slides/slide18.xml><?xml version="1.0" encoding="utf-8"?>
-<p:sld xmlns:a="http://schemas.openxmlformats.org/drawingml/2006/main" xmlns:p="http://schemas.openxmlformats.org/presentationml/2006/main" xmlns:r="http://schemas.openxmlformats.org/officeDocument/2006/relationships">
+<p:sld xmlns:a="http://schemas.openxmlformats.org/drawingml/2006/main" xmlns:r="http://schemas.openxmlformats.org/officeDocument/2006/relationships" xmlns:p="http://schemas.openxmlformats.org/presentationml/2006/main">
   <p:cSld>
     <p:spTree>
       <p:nvGrpSpPr>
@@ -5703,7 +5840,14 @@
         <p:cNvGrpSpPr/>
         <p:nvPr/>
       </p:nvGrpSpPr>
-      <p:grpSpPr/>
+      <p:grpSpPr>
+        <a:xfrm>
+          <a:off x="0" y="0"/>
+          <a:ext cx="0" cy="0"/>
+          <a:chOff x="0" y="0"/>
+          <a:chExt cx="0" cy="0"/>
+        </a:xfrm>
+      </p:grpSpPr>
       <p:sp>
         <p:nvSpPr>
           <p:cNvPr id="2" name="TextBox 1"/>
@@ -5734,6 +5878,7 @@
               </a:defRPr>
             </a:pPr>
             <a:r>
+              <a:rPr dirty="0"/>
               <a:t>Questions &amp; Answers</a:t>
             </a:r>
           </a:p>
@@ -5780,6 +5925,7 @@
                 </a:solidFill>
               </a:defRPr>
             </a:pPr>
+            <a:endParaRPr/>
           </a:p>
           <a:p>
             <a:pPr algn="ctr">
@@ -5804,7 +5950,7 @@
 </file>
 
 <file path=ppt/slides/slide2.xml><?xml version="1.0" encoding="utf-8"?>
-<p:sld xmlns:a="http://schemas.openxmlformats.org/drawingml/2006/main" xmlns:p="http://schemas.openxmlformats.org/presentationml/2006/main" xmlns:r="http://schemas.openxmlformats.org/officeDocument/2006/relationships">
+<p:sld xmlns:a="http://schemas.openxmlformats.org/drawingml/2006/main" xmlns:r="http://schemas.openxmlformats.org/officeDocument/2006/relationships" xmlns:p="http://schemas.openxmlformats.org/presentationml/2006/main">
   <p:cSld>
     <p:spTree>
       <p:nvGrpSpPr>
@@ -5812,7 +5958,14 @@
         <p:cNvGrpSpPr/>
         <p:nvPr/>
       </p:nvGrpSpPr>
-      <p:grpSpPr/>
+      <p:grpSpPr>
+        <a:xfrm>
+          <a:off x="0" y="0"/>
+          <a:ext cx="0" cy="0"/>
+          <a:chOff x="0" y="0"/>
+          <a:chExt cx="0" cy="0"/>
+        </a:xfrm>
+      </p:grpSpPr>
       <p:sp>
         <p:nvSpPr>
           <p:cNvPr id="2" name="TextBox 1"/>
@@ -5869,7 +6022,9 @@
             <a:spAutoFit/>
           </a:bodyPr>
           <a:lstStyle/>
-          <a:p/>
+          <a:p>
+            <a:endParaRPr/>
+          </a:p>
           <a:p>
             <a:pPr>
               <a:spcBef>
@@ -5986,7 +6141,7 @@
 </file>
 
 <file path=ppt/slides/slide3.xml><?xml version="1.0" encoding="utf-8"?>
-<p:sld xmlns:a="http://schemas.openxmlformats.org/drawingml/2006/main" xmlns:p="http://schemas.openxmlformats.org/presentationml/2006/main" xmlns:r="http://schemas.openxmlformats.org/officeDocument/2006/relationships">
+<p:sld xmlns:a="http://schemas.openxmlformats.org/drawingml/2006/main" xmlns:r="http://schemas.openxmlformats.org/officeDocument/2006/relationships" xmlns:p="http://schemas.openxmlformats.org/presentationml/2006/main">
   <p:cSld>
     <p:spTree>
       <p:nvGrpSpPr>
@@ -5994,7 +6149,14 @@
         <p:cNvGrpSpPr/>
         <p:nvPr/>
       </p:nvGrpSpPr>
-      <p:grpSpPr/>
+      <p:grpSpPr>
+        <a:xfrm>
+          <a:off x="0" y="0"/>
+          <a:ext cx="0" cy="0"/>
+          <a:chOff x="0" y="0"/>
+          <a:chExt cx="0" cy="0"/>
+        </a:xfrm>
+      </p:grpSpPr>
       <p:sp>
         <p:nvSpPr>
           <p:cNvPr id="2" name="TextBox 1"/>
@@ -6051,7 +6213,9 @@
             <a:spAutoFit/>
           </a:bodyPr>
           <a:lstStyle/>
-          <a:p/>
+          <a:p>
+            <a:endParaRPr/>
+          </a:p>
           <a:p>
             <a:pPr>
               <a:spcBef>
@@ -6153,7 +6317,7 @@
 </file>
 
 <file path=ppt/slides/slide4.xml><?xml version="1.0" encoding="utf-8"?>
-<p:sld xmlns:a="http://schemas.openxmlformats.org/drawingml/2006/main" xmlns:p="http://schemas.openxmlformats.org/presentationml/2006/main" xmlns:r="http://schemas.openxmlformats.org/officeDocument/2006/relationships">
+<p:sld xmlns:a="http://schemas.openxmlformats.org/drawingml/2006/main" xmlns:r="http://schemas.openxmlformats.org/officeDocument/2006/relationships" xmlns:p="http://schemas.openxmlformats.org/presentationml/2006/main">
   <p:cSld>
     <p:spTree>
       <p:nvGrpSpPr>
@@ -6161,7 +6325,14 @@
         <p:cNvGrpSpPr/>
         <p:nvPr/>
       </p:nvGrpSpPr>
-      <p:grpSpPr/>
+      <p:grpSpPr>
+        <a:xfrm>
+          <a:off x="0" y="0"/>
+          <a:ext cx="0" cy="0"/>
+          <a:chOff x="0" y="0"/>
+          <a:chExt cx="0" cy="0"/>
+        </a:xfrm>
+      </p:grpSpPr>
       <p:sp>
         <p:nvSpPr>
           <p:cNvPr id="2" name="TextBox 1"/>
@@ -6218,7 +6389,9 @@
             <a:spAutoFit/>
           </a:bodyPr>
           <a:lstStyle/>
-          <a:p/>
+          <a:p>
+            <a:endParaRPr/>
+          </a:p>
           <a:p>
             <a:pPr>
               <a:spcBef>
@@ -6335,7 +6508,7 @@
 </file>
 
 <file path=ppt/slides/slide5.xml><?xml version="1.0" encoding="utf-8"?>
-<p:sld xmlns:a="http://schemas.openxmlformats.org/drawingml/2006/main" xmlns:p="http://schemas.openxmlformats.org/presentationml/2006/main" xmlns:r="http://schemas.openxmlformats.org/officeDocument/2006/relationships">
+<p:sld xmlns:a="http://schemas.openxmlformats.org/drawingml/2006/main" xmlns:r="http://schemas.openxmlformats.org/officeDocument/2006/relationships" xmlns:p="http://schemas.openxmlformats.org/presentationml/2006/main">
   <p:cSld>
     <p:spTree>
       <p:nvGrpSpPr>
@@ -6343,7 +6516,14 @@
         <p:cNvGrpSpPr/>
         <p:nvPr/>
       </p:nvGrpSpPr>
-      <p:grpSpPr/>
+      <p:grpSpPr>
+        <a:xfrm>
+          <a:off x="0" y="0"/>
+          <a:ext cx="0" cy="0"/>
+          <a:chOff x="0" y="0"/>
+          <a:chExt cx="0" cy="0"/>
+        </a:xfrm>
+      </p:grpSpPr>
       <p:sp>
         <p:nvSpPr>
           <p:cNvPr id="2" name="TextBox 1"/>
@@ -6400,7 +6580,9 @@
             <a:spAutoFit/>
           </a:bodyPr>
           <a:lstStyle/>
-          <a:p/>
+          <a:p>
+            <a:endParaRPr/>
+          </a:p>
           <a:p>
             <a:pPr algn="ctr">
               <a:defRPr sz="2400" b="1">
@@ -6544,7 +6726,9 @@
             <a:spAutoFit/>
           </a:bodyPr>
           <a:lstStyle/>
-          <a:p/>
+          <a:p>
+            <a:endParaRPr/>
+          </a:p>
           <a:p>
             <a:pPr algn="ctr">
               <a:defRPr sz="2400" b="1">
@@ -6700,7 +6884,9 @@
             <a:spAutoFit/>
           </a:bodyPr>
           <a:lstStyle/>
-          <a:p/>
+          <a:p>
+            <a:endParaRPr/>
+          </a:p>
           <a:p>
             <a:pPr algn="ctr">
               <a:defRPr sz="2400" b="1">
@@ -6820,7 +7006,7 @@
 </file>
 
 <file path=ppt/slides/slide6.xml><?xml version="1.0" encoding="utf-8"?>
-<p:sld xmlns:a="http://schemas.openxmlformats.org/drawingml/2006/main" xmlns:p="http://schemas.openxmlformats.org/presentationml/2006/main" xmlns:r="http://schemas.openxmlformats.org/officeDocument/2006/relationships">
+<p:sld xmlns:a="http://schemas.openxmlformats.org/drawingml/2006/main" xmlns:r="http://schemas.openxmlformats.org/officeDocument/2006/relationships" xmlns:p="http://schemas.openxmlformats.org/presentationml/2006/main">
   <p:cSld>
     <p:spTree>
       <p:nvGrpSpPr>
@@ -6828,7 +7014,14 @@
         <p:cNvGrpSpPr/>
         <p:nvPr/>
       </p:nvGrpSpPr>
-      <p:grpSpPr/>
+      <p:grpSpPr>
+        <a:xfrm>
+          <a:off x="0" y="0"/>
+          <a:ext cx="0" cy="0"/>
+          <a:chOff x="0" y="0"/>
+          <a:chExt cx="0" cy="0"/>
+        </a:xfrm>
+      </p:grpSpPr>
       <p:sp>
         <p:nvSpPr>
           <p:cNvPr id="2" name="TextBox 1"/>
@@ -6885,7 +7078,9 @@
             <a:spAutoFit/>
           </a:bodyPr>
           <a:lstStyle/>
-          <a:p/>
+          <a:p>
+            <a:endParaRPr/>
+          </a:p>
           <a:p>
             <a:pPr>
               <a:defRPr sz="2400" b="1">
@@ -6981,7 +7176,7 @@
         <p:spPr>
           <a:xfrm>
             <a:off x="4754880" y="1371600"/>
-            <a:ext cx="3931920" cy="2560320"/>
+            <a:ext cx="3068148" cy="2677656"/>
           </a:xfrm>
           <a:prstGeom prst="rect">
             <a:avLst/>
@@ -6993,7 +7188,9 @@
             <a:spAutoFit/>
           </a:bodyPr>
           <a:lstStyle/>
-          <a:p/>
+          <a:p>
+            <a:endParaRPr dirty="0"/>
+          </a:p>
           <a:p>
             <a:pPr>
               <a:defRPr sz="2400" b="1">
@@ -7003,6 +7200,7 @@
               </a:defRPr>
             </a:pPr>
             <a:r>
+              <a:rPr dirty="0"/>
               <a:t>FRONTEND</a:t>
             </a:r>
           </a:p>
@@ -7015,6 +7213,7 @@
               </a:defRPr>
             </a:pPr>
             <a:r>
+              <a:rPr dirty="0"/>
               <a:t>• EJS Templates - Server-side Rendering</a:t>
             </a:r>
           </a:p>
@@ -7027,6 +7226,7 @@
               </a:defRPr>
             </a:pPr>
             <a:r>
+              <a:rPr dirty="0"/>
               <a:t>• CSS3 - Custom Variables &amp; Theming</a:t>
             </a:r>
           </a:p>
@@ -7039,6 +7239,7 @@
               </a:defRPr>
             </a:pPr>
             <a:r>
+              <a:rPr dirty="0"/>
               <a:t>• Vanilla JavaScript ES6+</a:t>
             </a:r>
           </a:p>
@@ -7051,6 +7252,7 @@
               </a:defRPr>
             </a:pPr>
             <a:r>
+              <a:rPr dirty="0"/>
               <a:t>• Responsive Design - Mobile-first</a:t>
             </a:r>
           </a:p>
@@ -7063,6 +7265,7 @@
               </a:defRPr>
             </a:pPr>
             <a:r>
+              <a:rPr dirty="0"/>
               <a:t>• WCAG 2.1 AA - Accessibility</a:t>
             </a:r>
           </a:p>
@@ -7075,8 +7278,46 @@
               </a:defRPr>
             </a:pPr>
             <a:r>
+              <a:rPr dirty="0"/>
               <a:t>• Dark Mode - Theme Switching</a:t>
             </a:r>
+            <a:endParaRPr lang="en-US" dirty="0"/>
+          </a:p>
+          <a:p>
+            <a:pPr>
+              <a:defRPr sz="1400">
+                <a:solidFill>
+                  <a:srgbClr val="666666"/>
+                </a:solidFill>
+              </a:defRPr>
+            </a:pPr>
+            <a:r>
+              <a:rPr lang="en-US" dirty="0"/>
+              <a:t>• Tailwind CSS</a:t>
+            </a:r>
+          </a:p>
+          <a:p>
+            <a:pPr>
+              <a:defRPr sz="1400">
+                <a:solidFill>
+                  <a:srgbClr val="666666"/>
+                </a:solidFill>
+              </a:defRPr>
+            </a:pPr>
+            <a:r>
+              <a:rPr lang="en-US" dirty="0"/>
+              <a:t>• Spline 3d for background</a:t>
+            </a:r>
+          </a:p>
+          <a:p>
+            <a:pPr>
+              <a:defRPr sz="1400">
+                <a:solidFill>
+                  <a:srgbClr val="666666"/>
+                </a:solidFill>
+              </a:defRPr>
+            </a:pPr>
+            <a:endParaRPr dirty="0"/>
           </a:p>
         </p:txBody>
       </p:sp>
@@ -7101,7 +7342,9 @@
             <a:spAutoFit/>
           </a:bodyPr>
           <a:lstStyle/>
-          <a:p/>
+          <a:p>
+            <a:endParaRPr dirty="0"/>
+          </a:p>
           <a:p>
             <a:pPr>
               <a:defRPr sz="2400" b="1">
@@ -7111,6 +7354,7 @@
               </a:defRPr>
             </a:pPr>
             <a:r>
+              <a:rPr dirty="0"/>
               <a:t>SECURITY</a:t>
             </a:r>
           </a:p>
@@ -7123,6 +7367,7 @@
               </a:defRPr>
             </a:pPr>
             <a:r>
+              <a:rPr dirty="0"/>
               <a:t>• HTTPS/TLS 1.3 - Encryption</a:t>
             </a:r>
           </a:p>
@@ -7135,18 +7380,28 @@
               </a:defRPr>
             </a:pPr>
             <a:r>
-              <a:t>• bcrypt - Password Hashing</a:t>
-            </a:r>
-          </a:p>
-          <a:p>
-            <a:pPr>
-              <a:defRPr sz="1400">
-                <a:solidFill>
-                  <a:srgbClr val="666666"/>
-                </a:solidFill>
-              </a:defRPr>
-            </a:pPr>
-            <a:r>
+              <a:rPr dirty="0"/>
+              <a:t>• </a:t>
+            </a:r>
+            <a:r>
+              <a:rPr dirty="0" err="1"/>
+              <a:t>bcrypt</a:t>
+            </a:r>
+            <a:r>
+              <a:rPr dirty="0"/>
+              <a:t> - Password Hashing</a:t>
+            </a:r>
+          </a:p>
+          <a:p>
+            <a:pPr>
+              <a:defRPr sz="1400">
+                <a:solidFill>
+                  <a:srgbClr val="666666"/>
+                </a:solidFill>
+              </a:defRPr>
+            </a:pPr>
+            <a:r>
+              <a:rPr dirty="0"/>
               <a:t>• express-session - Session Management</a:t>
             </a:r>
           </a:p>
@@ -7159,18 +7414,28 @@
               </a:defRPr>
             </a:pPr>
             <a:r>
-              <a:t>• csurf - CSRF Protection</a:t>
-            </a:r>
-          </a:p>
-          <a:p>
-            <a:pPr>
-              <a:defRPr sz="1400">
-                <a:solidFill>
-                  <a:srgbClr val="666666"/>
-                </a:solidFill>
-              </a:defRPr>
-            </a:pPr>
-            <a:r>
+              <a:rPr dirty="0"/>
+              <a:t>• </a:t>
+            </a:r>
+            <a:r>
+              <a:rPr dirty="0" err="1"/>
+              <a:t>csurf</a:t>
+            </a:r>
+            <a:r>
+              <a:rPr dirty="0"/>
+              <a:t> - CSRF Protection</a:t>
+            </a:r>
+          </a:p>
+          <a:p>
+            <a:pPr>
+              <a:defRPr sz="1400">
+                <a:solidFill>
+                  <a:srgbClr val="666666"/>
+                </a:solidFill>
+              </a:defRPr>
+            </a:pPr>
+            <a:r>
+              <a:rPr dirty="0"/>
               <a:t>• express-validator - Input Sanitization</a:t>
             </a:r>
           </a:p>
@@ -7197,7 +7462,9 @@
             <a:spAutoFit/>
           </a:bodyPr>
           <a:lstStyle/>
-          <a:p/>
+          <a:p>
+            <a:endParaRPr dirty="0"/>
+          </a:p>
           <a:p>
             <a:pPr>
               <a:defRPr sz="2400" b="1">
@@ -7207,6 +7474,7 @@
               </a:defRPr>
             </a:pPr>
             <a:r>
+              <a:rPr dirty="0"/>
               <a:t>DEPLOYMENT</a:t>
             </a:r>
           </a:p>
@@ -7219,18 +7487,28 @@
               </a:defRPr>
             </a:pPr>
             <a:r>
-              <a:t>• Vercel - Serverless Hosting</a:t>
-            </a:r>
-          </a:p>
-          <a:p>
-            <a:pPr>
-              <a:defRPr sz="1400">
-                <a:solidFill>
-                  <a:srgbClr val="666666"/>
-                </a:solidFill>
-              </a:defRPr>
-            </a:pPr>
-            <a:r>
+              <a:rPr dirty="0"/>
+              <a:t>• </a:t>
+            </a:r>
+            <a:r>
+              <a:rPr dirty="0" err="1"/>
+              <a:t>Vercel</a:t>
+            </a:r>
+            <a:r>
+              <a:rPr dirty="0"/>
+              <a:t> - Serverless Hosting</a:t>
+            </a:r>
+          </a:p>
+          <a:p>
+            <a:pPr>
+              <a:defRPr sz="1400">
+                <a:solidFill>
+                  <a:srgbClr val="666666"/>
+                </a:solidFill>
+              </a:defRPr>
+            </a:pPr>
+            <a:r>
+              <a:rPr dirty="0"/>
               <a:t>• Firebase Cloud - Database Hosting</a:t>
             </a:r>
           </a:p>
@@ -7243,6 +7521,7 @@
               </a:defRPr>
             </a:pPr>
             <a:r>
+              <a:rPr dirty="0"/>
               <a:t>• GitHub Actions - CI/CD Pipeline</a:t>
             </a:r>
           </a:p>
@@ -7255,18 +7534,28 @@
               </a:defRPr>
             </a:pPr>
             <a:r>
-              <a:t>• Cloudinary CDN - Static Assets</a:t>
-            </a:r>
-          </a:p>
-          <a:p>
-            <a:pPr>
-              <a:defRPr sz="1400">
-                <a:solidFill>
-                  <a:srgbClr val="666666"/>
-                </a:solidFill>
-              </a:defRPr>
-            </a:pPr>
-            <a:r>
+              <a:rPr dirty="0"/>
+              <a:t>• </a:t>
+            </a:r>
+            <a:r>
+              <a:rPr dirty="0" err="1"/>
+              <a:t>Cloudinary</a:t>
+            </a:r>
+            <a:r>
+              <a:rPr dirty="0"/>
+              <a:t> CDN - Static Assets</a:t>
+            </a:r>
+          </a:p>
+          <a:p>
+            <a:pPr>
+              <a:defRPr sz="1400">
+                <a:solidFill>
+                  <a:srgbClr val="666666"/>
+                </a:solidFill>
+              </a:defRPr>
+            </a:pPr>
+            <a:r>
+              <a:rPr dirty="0"/>
               <a:t>• Firebase Analytics - User Tracking</a:t>
             </a:r>
           </a:p>
@@ -7281,7 +7570,7 @@
 </file>
 
 <file path=ppt/slides/slide7.xml><?xml version="1.0" encoding="utf-8"?>
-<p:sld xmlns:a="http://schemas.openxmlformats.org/drawingml/2006/main" xmlns:p="http://schemas.openxmlformats.org/presentationml/2006/main" xmlns:r="http://schemas.openxmlformats.org/officeDocument/2006/relationships">
+<p:sld xmlns:a="http://schemas.openxmlformats.org/drawingml/2006/main" xmlns:r="http://schemas.openxmlformats.org/officeDocument/2006/relationships" xmlns:p="http://schemas.openxmlformats.org/presentationml/2006/main">
   <p:cSld>
     <p:spTree>
       <p:nvGrpSpPr>
@@ -7289,7 +7578,14 @@
         <p:cNvGrpSpPr/>
         <p:nvPr/>
       </p:nvGrpSpPr>
-      <p:grpSpPr/>
+      <p:grpSpPr>
+        <a:xfrm>
+          <a:off x="0" y="0"/>
+          <a:ext cx="0" cy="0"/>
+          <a:chOff x="0" y="0"/>
+          <a:chExt cx="0" cy="0"/>
+        </a:xfrm>
+      </p:grpSpPr>
       <p:sp>
         <p:nvSpPr>
           <p:cNvPr id="2" name="TextBox 1"/>
@@ -7334,7 +7630,7 @@
         <p:spPr>
           <a:xfrm>
             <a:off x="731520" y="1371600"/>
-            <a:ext cx="7680960" cy="5029200"/>
+            <a:ext cx="5478936" cy="3370153"/>
           </a:xfrm>
           <a:prstGeom prst="rect">
             <a:avLst/>
@@ -7346,7 +7642,9 @@
             <a:spAutoFit/>
           </a:bodyPr>
           <a:lstStyle/>
-          <a:p/>
+          <a:p>
+            <a:endParaRPr dirty="0"/>
+          </a:p>
           <a:p>
             <a:pPr>
               <a:spcBef>
@@ -7359,6 +7657,7 @@
               </a:defRPr>
             </a:pPr>
             <a:r>
+              <a:rPr dirty="0"/>
               <a:t>🔐 Multi-Role Authentication System</a:t>
             </a:r>
           </a:p>
@@ -7371,6 +7670,7 @@
               </a:defRPr>
             </a:pPr>
             <a:r>
+              <a:rPr dirty="0"/>
               <a:t>• Role-Based Access Control (RBAC) - Student, Teacher, Admin</a:t>
             </a:r>
           </a:p>
@@ -7383,6 +7683,7 @@
               </a:defRPr>
             </a:pPr>
             <a:r>
+              <a:rPr dirty="0"/>
               <a:t>• Google OAuth 2.0 integration for single sign-on</a:t>
             </a:r>
           </a:p>
@@ -7395,7 +7696,16 @@
               </a:defRPr>
             </a:pPr>
             <a:r>
-              <a:t>• Email/password authentication with bcrypt hashing</a:t>
+              <a:rPr dirty="0"/>
+              <a:t>• Email/password authentication with </a:t>
+            </a:r>
+            <a:r>
+              <a:rPr dirty="0" err="1"/>
+              <a:t>bcrypt</a:t>
+            </a:r>
+            <a:r>
+              <a:rPr dirty="0"/>
+              <a:t> hashing</a:t>
             </a:r>
           </a:p>
           <a:p>
@@ -7407,6 +7717,7 @@
               </a:defRPr>
             </a:pPr>
             <a:r>
+              <a:rPr dirty="0"/>
               <a:t>• Session management with secure cookies</a:t>
             </a:r>
           </a:p>
@@ -7422,6 +7733,7 @@
               </a:defRPr>
             </a:pPr>
             <a:r>
+              <a:rPr dirty="0"/>
               <a:t>📚 Course Management System</a:t>
             </a:r>
           </a:p>
@@ -7434,6 +7746,7 @@
               </a:defRPr>
             </a:pPr>
             <a:r>
+              <a:rPr dirty="0"/>
               <a:t>• Teachers create courses with rich text content</a:t>
             </a:r>
           </a:p>
@@ -7446,6 +7759,7 @@
               </a:defRPr>
             </a:pPr>
             <a:r>
+              <a:rPr dirty="0"/>
               <a:t>• Video embedding (YouTube, Vimeo)</a:t>
             </a:r>
           </a:p>
@@ -7458,8 +7772,14 @@
               </a:defRPr>
             </a:pPr>
             <a:r>
-              <a:t>• File uploads (PDFs, images) via Cloudinary</a:t>
-            </a:r>
+              <a:rPr dirty="0"/>
+              <a:t>• File uploads (PDFs, images) via </a:t>
+            </a:r>
+            <a:r>
+              <a:rPr dirty="0" err="1"/>
+              <a:t>Cloudinary</a:t>
+            </a:r>
+            <a:endParaRPr dirty="0"/>
           </a:p>
           <a:p>
             <a:pPr lvl="1">
@@ -7470,6 +7790,7 @@
               </a:defRPr>
             </a:pPr>
             <a:r>
+              <a:rPr dirty="0"/>
               <a:t>• Course categorization and tagging</a:t>
             </a:r>
           </a:p>
@@ -7482,8 +7803,14 @@
               </a:defRPr>
             </a:pPr>
             <a:r>
-              <a:t>• Pricing management ($0-$999)</a:t>
-            </a:r>
+              <a:rPr dirty="0"/>
+              <a:t>• </a:t>
+            </a:r>
+            <a:r>
+              <a:rPr lang="en-US" dirty="0"/>
+              <a:t>Subscription based pricing management with free tier or pro tier</a:t>
+            </a:r>
+            <a:endParaRPr dirty="0"/>
           </a:p>
         </p:txBody>
       </p:sp>
@@ -7496,7 +7823,7 @@
 </file>
 
 <file path=ppt/slides/slide8.xml><?xml version="1.0" encoding="utf-8"?>
-<p:sld xmlns:a="http://schemas.openxmlformats.org/drawingml/2006/main" xmlns:p="http://schemas.openxmlformats.org/presentationml/2006/main" xmlns:r="http://schemas.openxmlformats.org/officeDocument/2006/relationships">
+<p:sld xmlns:a="http://schemas.openxmlformats.org/drawingml/2006/main" xmlns:r="http://schemas.openxmlformats.org/officeDocument/2006/relationships" xmlns:p="http://schemas.openxmlformats.org/presentationml/2006/main">
   <p:cSld>
     <p:spTree>
       <p:nvGrpSpPr>
@@ -7504,7 +7831,14 @@
         <p:cNvGrpSpPr/>
         <p:nvPr/>
       </p:nvGrpSpPr>
-      <p:grpSpPr/>
+      <p:grpSpPr>
+        <a:xfrm>
+          <a:off x="0" y="0"/>
+          <a:ext cx="0" cy="0"/>
+          <a:chOff x="0" y="0"/>
+          <a:chExt cx="0" cy="0"/>
+        </a:xfrm>
+      </p:grpSpPr>
       <p:sp>
         <p:nvSpPr>
           <p:cNvPr id="2" name="TextBox 1"/>
@@ -7561,7 +7895,9 @@
             <a:spAutoFit/>
           </a:bodyPr>
           <a:lstStyle/>
-          <a:p/>
+          <a:p>
+            <a:endParaRPr dirty="0"/>
+          </a:p>
           <a:p>
             <a:pPr>
               <a:spcBef>
@@ -7574,6 +7910,7 @@
               </a:defRPr>
             </a:pPr>
             <a:r>
+              <a:rPr dirty="0"/>
               <a:t>📝 Interactive Quiz Engine</a:t>
             </a:r>
           </a:p>
@@ -7586,6 +7923,7 @@
               </a:defRPr>
             </a:pPr>
             <a:r>
+              <a:rPr dirty="0"/>
               <a:t>• Multiple question types (MCQ, True/False, Short Answer)</a:t>
             </a:r>
           </a:p>
@@ -7598,6 +7936,7 @@
               </a:defRPr>
             </a:pPr>
             <a:r>
+              <a:rPr dirty="0"/>
               <a:t>• Timer functionality with server-side validation</a:t>
             </a:r>
           </a:p>
@@ -7610,6 +7949,7 @@
               </a:defRPr>
             </a:pPr>
             <a:r>
+              <a:rPr dirty="0"/>
               <a:t>• Automatic grading for objective questions</a:t>
             </a:r>
           </a:p>
@@ -7622,6 +7962,7 @@
               </a:defRPr>
             </a:pPr>
             <a:r>
+              <a:rPr dirty="0"/>
               <a:t>• Progress tracking and retry logic</a:t>
             </a:r>
           </a:p>
@@ -7634,6 +7975,7 @@
               </a:defRPr>
             </a:pPr>
             <a:r>
+              <a:rPr dirty="0"/>
               <a:t>• Certificate generation upon passing (70% threshold)</a:t>
             </a:r>
           </a:p>
@@ -7649,6 +7991,7 @@
               </a:defRPr>
             </a:pPr>
             <a:r>
+              <a:rPr dirty="0"/>
               <a:t>💳 Stripe Payment Integration</a:t>
             </a:r>
           </a:p>
@@ -7661,6 +8004,7 @@
               </a:defRPr>
             </a:pPr>
             <a:r>
+              <a:rPr dirty="0"/>
               <a:t>• Secure checkout sessions (PCI DSS compliant)</a:t>
             </a:r>
           </a:p>
@@ -7673,6 +8017,7 @@
               </a:defRPr>
             </a:pPr>
             <a:r>
+              <a:rPr dirty="0"/>
               <a:t>• Webhook handling for payment confirmations</a:t>
             </a:r>
           </a:p>
@@ -7685,6 +8030,7 @@
               </a:defRPr>
             </a:pPr>
             <a:r>
+              <a:rPr dirty="0"/>
               <a:t>• Order management and tracking</a:t>
             </a:r>
           </a:p>
@@ -7697,6 +8043,7 @@
               </a:defRPr>
             </a:pPr>
             <a:r>
+              <a:rPr dirty="0"/>
               <a:t>• Automatic enrollment after successful payment</a:t>
             </a:r>
           </a:p>
@@ -7709,6 +8056,7 @@
               </a:defRPr>
             </a:pPr>
             <a:r>
+              <a:rPr dirty="0"/>
               <a:t>• Refund support</a:t>
             </a:r>
           </a:p>
@@ -7723,7 +8071,7 @@
 </file>
 
 <file path=ppt/slides/slide9.xml><?xml version="1.0" encoding="utf-8"?>
-<p:sld xmlns:a="http://schemas.openxmlformats.org/drawingml/2006/main" xmlns:p="http://schemas.openxmlformats.org/presentationml/2006/main" xmlns:r="http://schemas.openxmlformats.org/officeDocument/2006/relationships">
+<p:sld xmlns:a="http://schemas.openxmlformats.org/drawingml/2006/main" xmlns:r="http://schemas.openxmlformats.org/officeDocument/2006/relationships" xmlns:p="http://schemas.openxmlformats.org/presentationml/2006/main">
   <p:cSld>
     <p:spTree>
       <p:nvGrpSpPr>
@@ -7731,7 +8079,14 @@
         <p:cNvGrpSpPr/>
         <p:nvPr/>
       </p:nvGrpSpPr>
-      <p:grpSpPr/>
+      <p:grpSpPr>
+        <a:xfrm>
+          <a:off x="0" y="0"/>
+          <a:ext cx="0" cy="0"/>
+          <a:chOff x="0" y="0"/>
+          <a:chExt cx="0" cy="0"/>
+        </a:xfrm>
+      </p:grpSpPr>
       <p:sp>
         <p:nvSpPr>
           <p:cNvPr id="2" name="TextBox 1"/>
@@ -7788,7 +8143,9 @@
             <a:spAutoFit/>
           </a:bodyPr>
           <a:lstStyle/>
-          <a:p/>
+          <a:p>
+            <a:endParaRPr dirty="0"/>
+          </a:p>
           <a:p>
             <a:pPr>
               <a:spcBef>
@@ -7801,6 +8158,7 @@
               </a:defRPr>
             </a:pPr>
             <a:r>
+              <a:rPr dirty="0"/>
               <a:t>👥 Community Forum System</a:t>
             </a:r>
           </a:p>
@@ -7813,6 +8171,7 @@
               </a:defRPr>
             </a:pPr>
             <a:r>
+              <a:rPr dirty="0"/>
               <a:t>• Group creation by teachers for study groups</a:t>
             </a:r>
           </a:p>
@@ -7825,6 +8184,7 @@
               </a:defRPr>
             </a:pPr>
             <a:r>
+              <a:rPr dirty="0"/>
               <a:t>• Post management with rich text editor</a:t>
             </a:r>
           </a:p>
@@ -7837,6 +8197,7 @@
               </a:defRPr>
             </a:pPr>
             <a:r>
+              <a:rPr dirty="0"/>
               <a:t>• Threaded comments for discussions</a:t>
             </a:r>
           </a:p>
@@ -7849,6 +8210,7 @@
               </a:defRPr>
             </a:pPr>
             <a:r>
+              <a:rPr dirty="0"/>
               <a:t>• Content moderation by admins</a:t>
             </a:r>
           </a:p>
@@ -7861,6 +8223,7 @@
               </a:defRPr>
             </a:pPr>
             <a:r>
+              <a:rPr dirty="0"/>
               <a:t>• Real-time updates using Firebase listeners</a:t>
             </a:r>
           </a:p>
@@ -7876,6 +8239,7 @@
               </a:defRPr>
             </a:pPr>
             <a:r>
+              <a:rPr dirty="0"/>
               <a:t>🌙 Dark Mode &amp; Accessibility</a:t>
             </a:r>
           </a:p>
@@ -7888,6 +8252,7 @@
               </a:defRPr>
             </a:pPr>
             <a:r>
+              <a:rPr dirty="0"/>
               <a:t>• System preference detection</a:t>
             </a:r>
           </a:p>
@@ -7900,6 +8265,7 @@
               </a:defRPr>
             </a:pPr>
             <a:r>
+              <a:rPr dirty="0"/>
               <a:t>• Manual toggle with persistent storage</a:t>
             </a:r>
           </a:p>
@@ -7912,6 +8278,7 @@
               </a:defRPr>
             </a:pPr>
             <a:r>
+              <a:rPr dirty="0"/>
               <a:t>• WCAG 2.1 Level AA compliance (4.5:1 contrast ratio)</a:t>
             </a:r>
           </a:p>
@@ -7924,6 +8291,7 @@
               </a:defRPr>
             </a:pPr>
             <a:r>
+              <a:rPr dirty="0"/>
               <a:t>• Keyboard navigation support</a:t>
             </a:r>
           </a:p>
@@ -7936,6 +8304,7 @@
               </a:defRPr>
             </a:pPr>
             <a:r>
+              <a:rPr dirty="0"/>
               <a:t>• Screen reader compatibility (ARIA labels)</a:t>
             </a:r>
           </a:p>

</xml_diff>